<commit_message>
Upload rust 1 ~ 22 and Upate 4.pptx
</commit_message>
<xml_diff>
--- a/4.pptx
+++ b/4.pptx
@@ -275,7 +275,7 @@
           <a:p>
             <a:fld id="{76969C88-B244-455D-A017-012B25B1ACDD}" type="datetimeFigureOut">
               <a:rPr lang="en-US" smtClean="0"/>
-              <a:t>2/2/2024</a:t>
+              <a:t>2/12/2024</a:t>
             </a:fld>
             <a:endParaRPr lang="en-US"/>
           </a:p>
@@ -489,7 +489,7 @@
           <a:p>
             <a:fld id="{76969C88-B244-455D-A017-012B25B1ACDD}" type="datetimeFigureOut">
               <a:rPr lang="en-US" smtClean="0"/>
-              <a:t>2/2/2024</a:t>
+              <a:t>2/12/2024</a:t>
             </a:fld>
             <a:endParaRPr lang="en-US"/>
           </a:p>
@@ -713,7 +713,7 @@
           <a:p>
             <a:fld id="{76969C88-B244-455D-A017-012B25B1ACDD}" type="datetimeFigureOut">
               <a:rPr lang="en-US" smtClean="0"/>
-              <a:t>2/2/2024</a:t>
+              <a:t>2/12/2024</a:t>
             </a:fld>
             <a:endParaRPr lang="en-US"/>
           </a:p>
@@ -953,7 +953,7 @@
           <a:p>
             <a:fld id="{76969C88-B244-455D-A017-012B25B1ACDD}" type="datetimeFigureOut">
               <a:rPr lang="en-US" smtClean="0"/>
-              <a:t>2/2/2024</a:t>
+              <a:t>2/12/2024</a:t>
             </a:fld>
             <a:endParaRPr lang="en-US" dirty="0"/>
           </a:p>
@@ -1174,7 +1174,7 @@
           <a:p>
             <a:fld id="{76969C88-B244-455D-A017-012B25B1ACDD}" type="datetimeFigureOut">
               <a:rPr lang="en-US" smtClean="0"/>
-              <a:t>2/2/2024</a:t>
+              <a:t>2/12/2024</a:t>
             </a:fld>
             <a:endParaRPr lang="en-US"/>
           </a:p>
@@ -1464,7 +1464,7 @@
           <a:p>
             <a:fld id="{76969C88-B244-455D-A017-012B25B1ACDD}" type="datetimeFigureOut">
               <a:rPr lang="en-US" smtClean="0"/>
-              <a:t>2/2/2024</a:t>
+              <a:t>2/12/2024</a:t>
             </a:fld>
             <a:endParaRPr lang="en-US"/>
           </a:p>
@@ -1822,7 +1822,7 @@
           <a:p>
             <a:fld id="{76969C88-B244-455D-A017-012B25B1ACDD}" type="datetimeFigureOut">
               <a:rPr lang="en-US" smtClean="0"/>
-              <a:t>2/2/2024</a:t>
+              <a:t>2/12/2024</a:t>
             </a:fld>
             <a:endParaRPr lang="en-US"/>
           </a:p>
@@ -1988,7 +1988,7 @@
           <a:p>
             <a:fld id="{76969C88-B244-455D-A017-012B25B1ACDD}" type="datetimeFigureOut">
               <a:rPr lang="en-US" smtClean="0"/>
-              <a:t>2/2/2024</a:t>
+              <a:t>2/12/2024</a:t>
             </a:fld>
             <a:endParaRPr lang="en-US"/>
           </a:p>
@@ -2047,7 +2047,7 @@
           <a:p>
             <a:fld id="{76969C88-B244-455D-A017-012B25B1ACDD}" type="datetimeFigureOut">
               <a:rPr lang="en-US" smtClean="0"/>
-              <a:t>2/2/2024</a:t>
+              <a:t>2/12/2024</a:t>
             </a:fld>
             <a:endParaRPr lang="en-US"/>
           </a:p>
@@ -2375,7 +2375,7 @@
           <a:p>
             <a:fld id="{76969C88-B244-455D-A017-012B25B1ACDD}" type="datetimeFigureOut">
               <a:rPr lang="en-US" smtClean="0"/>
-              <a:t>2/2/2024</a:t>
+              <a:t>2/12/2024</a:t>
             </a:fld>
             <a:endParaRPr lang="en-US"/>
           </a:p>
@@ -2682,7 +2682,7 @@
           <a:p>
             <a:fld id="{76969C88-B244-455D-A017-012B25B1ACDD}" type="datetimeFigureOut">
               <a:rPr lang="en-US" smtClean="0"/>
-              <a:t>2/2/2024</a:t>
+              <a:t>2/12/2024</a:t>
             </a:fld>
             <a:endParaRPr lang="en-US"/>
           </a:p>
@@ -3448,7 +3448,7 @@
             <a:fld id="{76969C88-B244-455D-A017-012B25B1ACDD}" type="datetimeFigureOut">
               <a:rPr lang="en-US" smtClean="0"/>
               <a:pPr/>
-              <a:t>2/2/2024</a:t>
+              <a:t>2/12/2024</a:t>
             </a:fld>
             <a:endParaRPr lang="en-US"/>
           </a:p>
@@ -5331,15 +5331,409 @@
             <p:ph idx="1"/>
           </p:nvPr>
         </p:nvSpPr>
-        <p:spPr/>
-        <p:txBody>
-          <a:bodyPr/>
-          <a:lstStyle/>
-          <a:p>
-            <a:endParaRPr lang="ko-KR" altLang="en-US"/>
-          </a:p>
-        </p:txBody>
-      </p:sp>
+        <p:spPr>
+          <a:xfrm>
+            <a:off x="762000" y="1765139"/>
+            <a:ext cx="10668000" cy="5001421"/>
+          </a:xfrm>
+        </p:spPr>
+        <p:txBody>
+          <a:bodyPr/>
+          <a:lstStyle/>
+          <a:p>
+            <a:r>
+              <a:rPr lang="en-US" altLang="ko-KR" sz="1600" dirty="0"/>
+              <a:t>L1</a:t>
+            </a:r>
+            <a:r>
+              <a:rPr lang="ko-KR" altLang="en-US" sz="1600" dirty="0"/>
+              <a:t>은 물리적인 선 또는 전파 등의 통신을 정의한 계층입니다</a:t>
+            </a:r>
+            <a:br>
+              <a:rPr lang="en-US" altLang="ko-KR" sz="1600" dirty="0"/>
+            </a:br>
+            <a:r>
+              <a:rPr lang="ko-KR" altLang="en-US" sz="1600" dirty="0"/>
+              <a:t>이 때</a:t>
+            </a:r>
+            <a:r>
+              <a:rPr lang="en-US" altLang="ko-KR" sz="1600" dirty="0"/>
+              <a:t>, </a:t>
+            </a:r>
+            <a:r>
+              <a:rPr lang="ko-KR" altLang="en-US" sz="1600" dirty="0"/>
+              <a:t>선 또는 전파는 두 장치간 통신을 수행 할 때</a:t>
+            </a:r>
+            <a:br>
+              <a:rPr lang="en-US" altLang="ko-KR" sz="1600" dirty="0"/>
+            </a:br>
+            <a:r>
+              <a:rPr lang="ko-KR" altLang="en-US" sz="1600" dirty="0"/>
+              <a:t>각 장치는 수신과 송신이 모두 이루어져야 하기 때문에 두 방향으로 통신을 수행할 수 밖에 없습니다</a:t>
+            </a:r>
+            <a:endParaRPr lang="en-US" altLang="ko-KR" sz="1600" dirty="0"/>
+          </a:p>
+          <a:p>
+            <a:r>
+              <a:rPr lang="ko-KR" altLang="en-US" sz="1600" dirty="0"/>
+              <a:t>하지만</a:t>
+            </a:r>
+            <a:r>
+              <a:rPr lang="en-US" altLang="ko-KR" sz="1600" dirty="0"/>
+              <a:t>, </a:t>
+            </a:r>
+            <a:r>
+              <a:rPr lang="ko-KR" altLang="en-US" sz="1600" dirty="0"/>
+              <a:t>물리장치는 보통 하나의 선이나 같은 장소를 사용하는 방향이 다른 두 전파가 일반적이기 때문에</a:t>
+            </a:r>
+            <a:br>
+              <a:rPr lang="en-US" altLang="ko-KR" sz="1600" dirty="0"/>
+            </a:br>
+            <a:r>
+              <a:rPr lang="ko-KR" altLang="en-US" sz="1600" dirty="0"/>
+              <a:t>다양한 전송모드가 생길 수 있습니다</a:t>
+            </a:r>
+            <a:endParaRPr lang="en-US" altLang="ko-KR" sz="1600" dirty="0"/>
+          </a:p>
+          <a:p>
+            <a:pPr marL="342900" indent="-342900">
+              <a:buFont typeface="+mj-lt"/>
+              <a:buAutoNum type="arabicPeriod"/>
+            </a:pPr>
+            <a:r>
+              <a:rPr lang="en-US" altLang="ko-KR" sz="1600" dirty="0"/>
+              <a:t>Simplex:</a:t>
+            </a:r>
+            <a:r>
+              <a:rPr lang="ko-KR" altLang="en-US" sz="1600" dirty="0"/>
+              <a:t> 두 장치는 각자 다른 작업만을 수행하여</a:t>
+            </a:r>
+            <a:br>
+              <a:rPr lang="en-US" altLang="ko-KR" sz="1600" dirty="0"/>
+            </a:br>
+            <a:r>
+              <a:rPr lang="ko-KR" altLang="en-US" sz="1600" dirty="0"/>
+              <a:t>단 방향 통신을 하는 경우를 말합니다</a:t>
+            </a:r>
+            <a:endParaRPr lang="en-US" altLang="ko-KR" sz="1600" dirty="0"/>
+          </a:p>
+          <a:p>
+            <a:pPr marL="342900" indent="-342900">
+              <a:buFont typeface="+mj-lt"/>
+              <a:buAutoNum type="arabicPeriod"/>
+            </a:pPr>
+            <a:r>
+              <a:rPr lang="en-US" altLang="ko-KR" sz="1600" dirty="0"/>
+              <a:t>Half-Duplex: </a:t>
+            </a:r>
+            <a:r>
+              <a:rPr lang="ko-KR" altLang="en-US" sz="1600" dirty="0"/>
+              <a:t>두 장치는 모두 같은 작업을 수행하고</a:t>
+            </a:r>
+            <a:br>
+              <a:rPr lang="en-US" altLang="ko-KR" sz="1600" dirty="0"/>
+            </a:br>
+            <a:r>
+              <a:rPr lang="ko-KR" altLang="en-US" sz="1600" dirty="0"/>
+              <a:t>하나의 물리장치로부터 서로 간의 순서를 지켜</a:t>
+            </a:r>
+            <a:br>
+              <a:rPr lang="en-US" altLang="ko-KR" sz="1600" dirty="0"/>
+            </a:br>
+            <a:r>
+              <a:rPr lang="ko-KR" altLang="en-US" sz="1600" dirty="0"/>
+              <a:t>양 방향 통신을 하는 경우를 말합니다</a:t>
+            </a:r>
+            <a:br>
+              <a:rPr lang="en-US" altLang="ko-KR" sz="1600" dirty="0"/>
+            </a:br>
+            <a:r>
+              <a:rPr lang="ko-KR" altLang="en-US" sz="1600" dirty="0"/>
+              <a:t>다양한 방법이 존재하지만</a:t>
+            </a:r>
+            <a:r>
+              <a:rPr lang="en-US" altLang="ko-KR" sz="1600" dirty="0"/>
+              <a:t>(</a:t>
+            </a:r>
+            <a:r>
+              <a:rPr lang="ko-KR" altLang="en-US" sz="1600" dirty="0"/>
+              <a:t>무전기 등</a:t>
+            </a:r>
+            <a:r>
+              <a:rPr lang="en-US" altLang="ko-KR" sz="1600" dirty="0"/>
+              <a:t>),</a:t>
+            </a:r>
+            <a:br>
+              <a:rPr lang="en-US" altLang="ko-KR" sz="1600" dirty="0"/>
+            </a:br>
+            <a:r>
+              <a:rPr lang="ko-KR" altLang="en-US" sz="1600" dirty="0"/>
+              <a:t>대표적으로 </a:t>
+            </a:r>
+            <a:r>
+              <a:rPr lang="en-US" altLang="ko-KR" sz="1600" dirty="0"/>
+              <a:t>CSMA/CD, CSMA/CA</a:t>
+            </a:r>
+            <a:r>
+              <a:rPr lang="ko-KR" altLang="en-US" sz="1600" dirty="0"/>
+              <a:t>등이 있습니다</a:t>
+            </a:r>
+            <a:endParaRPr lang="en-US" altLang="ko-KR" sz="1600" dirty="0"/>
+          </a:p>
+          <a:p>
+            <a:pPr marL="342900" indent="-342900">
+              <a:buFont typeface="+mj-lt"/>
+              <a:buAutoNum type="arabicPeriod"/>
+            </a:pPr>
+            <a:r>
+              <a:rPr lang="en-US" altLang="ko-KR" sz="1600" dirty="0"/>
+              <a:t>Full-Duplex: </a:t>
+            </a:r>
+            <a:r>
+              <a:rPr lang="ko-KR" altLang="en-US" sz="1600" dirty="0"/>
+              <a:t>두 장치는 모두 같은 작업을 수행하고</a:t>
+            </a:r>
+            <a:br>
+              <a:rPr lang="en-US" altLang="ko-KR" sz="1600" dirty="0"/>
+            </a:br>
+            <a:r>
+              <a:rPr lang="ko-KR" altLang="en-US" sz="1600" dirty="0"/>
+              <a:t>두 개의 물리장치로부터 독립적인 송수신을 하여</a:t>
+            </a:r>
+            <a:br>
+              <a:rPr lang="en-US" altLang="ko-KR" sz="1600" dirty="0"/>
+            </a:br>
+            <a:r>
+              <a:rPr lang="ko-KR" altLang="en-US" sz="1600" dirty="0"/>
+              <a:t>양방향 통신을 하는 경우를 말합니다</a:t>
+            </a:r>
+            <a:br>
+              <a:rPr lang="en-US" altLang="ko-KR" sz="1600" dirty="0"/>
+            </a:br>
+            <a:r>
+              <a:rPr lang="ko-KR" altLang="en-US" sz="1600" dirty="0"/>
+              <a:t>오늘날 일반적인 랜 선들은 대부분 이 방식을 사용합니다</a:t>
+            </a:r>
+            <a:endParaRPr lang="en-US" altLang="ko-KR" sz="1600" dirty="0"/>
+          </a:p>
+        </p:txBody>
+      </p:sp>
+      <p:pic>
+        <p:nvPicPr>
+          <p:cNvPr id="5" name="그림 4" descr="스크린샷, 라인, 도표, 직사각형이(가) 표시된 사진&#10;&#10;자동 생성된 설명">
+            <a:extLst>
+              <a:ext uri="{FF2B5EF4-FFF2-40B4-BE49-F238E27FC236}">
+                <a16:creationId xmlns:a16="http://schemas.microsoft.com/office/drawing/2014/main" id="{3D9DF440-C580-0FFC-9E28-3884D072C00E}"/>
+              </a:ext>
+            </a:extLst>
+          </p:cNvPr>
+          <p:cNvPicPr>
+            <a:picLocks noChangeAspect="1"/>
+          </p:cNvPicPr>
+          <p:nvPr/>
+        </p:nvPicPr>
+        <p:blipFill>
+          <a:blip r:embed="rId2">
+            <a:extLst>
+              <a:ext uri="{28A0092B-C50C-407E-A947-70E740481C1C}">
+                <a14:useLocalDpi xmlns:a14="http://schemas.microsoft.com/office/drawing/2010/main" val="0"/>
+              </a:ext>
+            </a:extLst>
+          </a:blip>
+          <a:stretch>
+            <a:fillRect/>
+          </a:stretch>
+        </p:blipFill>
+        <p:spPr>
+          <a:xfrm>
+            <a:off x="6729548" y="3191462"/>
+            <a:ext cx="5376454" cy="1016416"/>
+          </a:xfrm>
+          <a:prstGeom prst="rect">
+            <a:avLst/>
+          </a:prstGeom>
+        </p:spPr>
+      </p:pic>
+      <p:pic>
+        <p:nvPicPr>
+          <p:cNvPr id="7" name="그림 6" descr="도표, 라인, 텍스트, 스크린샷이(가) 표시된 사진&#10;&#10;자동 생성된 설명">
+            <a:extLst>
+              <a:ext uri="{FF2B5EF4-FFF2-40B4-BE49-F238E27FC236}">
+                <a16:creationId xmlns:a16="http://schemas.microsoft.com/office/drawing/2014/main" id="{C0B98A30-C924-26E9-2A3D-FEBE01E8BA86}"/>
+              </a:ext>
+            </a:extLst>
+          </p:cNvPr>
+          <p:cNvPicPr>
+            <a:picLocks noChangeAspect="1"/>
+          </p:cNvPicPr>
+          <p:nvPr/>
+        </p:nvPicPr>
+        <p:blipFill>
+          <a:blip r:embed="rId3">
+            <a:extLst>
+              <a:ext uri="{28A0092B-C50C-407E-A947-70E740481C1C}">
+                <a14:useLocalDpi xmlns:a14="http://schemas.microsoft.com/office/drawing/2010/main" val="0"/>
+              </a:ext>
+            </a:extLst>
+          </a:blip>
+          <a:stretch>
+            <a:fillRect/>
+          </a:stretch>
+        </p:blipFill>
+        <p:spPr>
+          <a:xfrm>
+            <a:off x="6728793" y="4220940"/>
+            <a:ext cx="5376454" cy="1283017"/>
+          </a:xfrm>
+          <a:prstGeom prst="rect">
+            <a:avLst/>
+          </a:prstGeom>
+        </p:spPr>
+      </p:pic>
+      <p:pic>
+        <p:nvPicPr>
+          <p:cNvPr id="9" name="그림 8" descr="라인, 텍스트, 스크린샷, 직사각형이(가) 표시된 사진&#10;&#10;자동 생성된 설명">
+            <a:extLst>
+              <a:ext uri="{FF2B5EF4-FFF2-40B4-BE49-F238E27FC236}">
+                <a16:creationId xmlns:a16="http://schemas.microsoft.com/office/drawing/2014/main" id="{867FDA75-EACA-A71A-DFE9-C8B46842BE8E}"/>
+              </a:ext>
+            </a:extLst>
+          </p:cNvPr>
+          <p:cNvPicPr>
+            <a:picLocks noChangeAspect="1"/>
+          </p:cNvPicPr>
+          <p:nvPr/>
+        </p:nvPicPr>
+        <p:blipFill>
+          <a:blip r:embed="rId4">
+            <a:extLst>
+              <a:ext uri="{28A0092B-C50C-407E-A947-70E740481C1C}">
+                <a14:useLocalDpi xmlns:a14="http://schemas.microsoft.com/office/drawing/2010/main" val="0"/>
+              </a:ext>
+            </a:extLst>
+          </a:blip>
+          <a:stretch>
+            <a:fillRect/>
+          </a:stretch>
+        </p:blipFill>
+        <p:spPr>
+          <a:xfrm>
+            <a:off x="6728791" y="5517020"/>
+            <a:ext cx="5376455" cy="1171934"/>
+          </a:xfrm>
+          <a:prstGeom prst="rect">
+            <a:avLst/>
+          </a:prstGeom>
+        </p:spPr>
+      </p:pic>
+      <p:pic>
+        <p:nvPicPr>
+          <p:cNvPr id="10" name="그림 9" descr="스크린샷, 라인, 도표, 직사각형이(가) 표시된 사진&#10;&#10;자동 생성된 설명">
+            <a:extLst>
+              <a:ext uri="{FF2B5EF4-FFF2-40B4-BE49-F238E27FC236}">
+                <a16:creationId xmlns:a16="http://schemas.microsoft.com/office/drawing/2014/main" id="{0BF602EF-74A4-6205-214C-AA941408B100}"/>
+              </a:ext>
+            </a:extLst>
+          </p:cNvPr>
+          <p:cNvPicPr>
+            <a:picLocks noChangeAspect="1"/>
+          </p:cNvPicPr>
+          <p:nvPr/>
+        </p:nvPicPr>
+        <p:blipFill>
+          <a:blip r:embed="rId2">
+            <a:extLst>
+              <a:ext uri="{28A0092B-C50C-407E-A947-70E740481C1C}">
+                <a14:useLocalDpi xmlns:a14="http://schemas.microsoft.com/office/drawing/2010/main" val="0"/>
+              </a:ext>
+            </a:extLst>
+          </a:blip>
+          <a:stretch>
+            <a:fillRect/>
+          </a:stretch>
+        </p:blipFill>
+        <p:spPr>
+          <a:xfrm>
+            <a:off x="6768735" y="3191462"/>
+            <a:ext cx="5376454" cy="1016416"/>
+          </a:xfrm>
+          <a:prstGeom prst="rect">
+            <a:avLst/>
+          </a:prstGeom>
+        </p:spPr>
+      </p:pic>
+      <p:pic>
+        <p:nvPicPr>
+          <p:cNvPr id="11" name="그림 10" descr="도표, 라인, 텍스트, 스크린샷이(가) 표시된 사진&#10;&#10;자동 생성된 설명">
+            <a:extLst>
+              <a:ext uri="{FF2B5EF4-FFF2-40B4-BE49-F238E27FC236}">
+                <a16:creationId xmlns:a16="http://schemas.microsoft.com/office/drawing/2014/main" id="{2ABA417C-3314-B0D0-A605-891E11849515}"/>
+              </a:ext>
+            </a:extLst>
+          </p:cNvPr>
+          <p:cNvPicPr>
+            <a:picLocks noChangeAspect="1"/>
+          </p:cNvPicPr>
+          <p:nvPr/>
+        </p:nvPicPr>
+        <p:blipFill>
+          <a:blip r:embed="rId3">
+            <a:extLst>
+              <a:ext uri="{28A0092B-C50C-407E-A947-70E740481C1C}">
+                <a14:useLocalDpi xmlns:a14="http://schemas.microsoft.com/office/drawing/2010/main" val="0"/>
+              </a:ext>
+            </a:extLst>
+          </a:blip>
+          <a:stretch>
+            <a:fillRect/>
+          </a:stretch>
+        </p:blipFill>
+        <p:spPr>
+          <a:xfrm>
+            <a:off x="6767980" y="4220940"/>
+            <a:ext cx="5376454" cy="1283017"/>
+          </a:xfrm>
+          <a:prstGeom prst="rect">
+            <a:avLst/>
+          </a:prstGeom>
+        </p:spPr>
+      </p:pic>
+      <p:pic>
+        <p:nvPicPr>
+          <p:cNvPr id="12" name="그림 11" descr="라인, 텍스트, 스크린샷, 직사각형이(가) 표시된 사진&#10;&#10;자동 생성된 설명">
+            <a:extLst>
+              <a:ext uri="{FF2B5EF4-FFF2-40B4-BE49-F238E27FC236}">
+                <a16:creationId xmlns:a16="http://schemas.microsoft.com/office/drawing/2014/main" id="{8301DA9C-F064-9ED0-A099-B0411BC57161}"/>
+              </a:ext>
+            </a:extLst>
+          </p:cNvPr>
+          <p:cNvPicPr>
+            <a:picLocks noChangeAspect="1"/>
+          </p:cNvPicPr>
+          <p:nvPr/>
+        </p:nvPicPr>
+        <p:blipFill>
+          <a:blip r:embed="rId4">
+            <a:extLst>
+              <a:ext uri="{28A0092B-C50C-407E-A947-70E740481C1C}">
+                <a14:useLocalDpi xmlns:a14="http://schemas.microsoft.com/office/drawing/2010/main" val="0"/>
+              </a:ext>
+            </a:extLst>
+          </a:blip>
+          <a:stretch>
+            <a:fillRect/>
+          </a:stretch>
+        </p:blipFill>
+        <p:spPr>
+          <a:xfrm>
+            <a:off x="6767978" y="5517020"/>
+            <a:ext cx="5376455" cy="1171934"/>
+          </a:xfrm>
+          <a:prstGeom prst="rect">
+            <a:avLst/>
+          </a:prstGeom>
+        </p:spPr>
+      </p:pic>
     </p:spTree>
     <p:extLst>
       <p:ext uri="{BB962C8B-B14F-4D97-AF65-F5344CB8AC3E}">
@@ -5415,12 +5809,342 @@
             <p:ph idx="1"/>
           </p:nvPr>
         </p:nvSpPr>
-        <p:spPr/>
-        <p:txBody>
-          <a:bodyPr/>
-          <a:lstStyle/>
-          <a:p>
-            <a:endParaRPr lang="ko-KR" altLang="en-US"/>
+        <p:spPr>
+          <a:xfrm>
+            <a:off x="761999" y="1765139"/>
+            <a:ext cx="10759441" cy="5030918"/>
+          </a:xfrm>
+        </p:spPr>
+        <p:txBody>
+          <a:bodyPr/>
+          <a:lstStyle/>
+          <a:p>
+            <a:r>
+              <a:rPr lang="ko-KR" altLang="en-US" sz="1600" dirty="0"/>
+              <a:t>오늘날 통신은 </a:t>
+            </a:r>
+            <a:r>
+              <a:rPr lang="en-US" altLang="ko-KR" sz="1600" dirty="0"/>
+              <a:t>LAN </a:t>
+            </a:r>
+            <a:r>
+              <a:rPr lang="ko-KR" altLang="en-US" sz="1600" dirty="0"/>
+              <a:t>선을 사용한 컴퓨터보다도</a:t>
+            </a:r>
+            <a:r>
+              <a:rPr lang="en-US" altLang="ko-KR" sz="1600" dirty="0"/>
+              <a:t> </a:t>
+            </a:r>
+            <a:r>
+              <a:rPr lang="ko-KR" altLang="en-US" sz="1600" dirty="0"/>
+              <a:t>스마트폰</a:t>
+            </a:r>
+            <a:r>
+              <a:rPr lang="en-US" altLang="ko-KR" sz="1600" dirty="0"/>
+              <a:t>, </a:t>
+            </a:r>
+            <a:r>
+              <a:rPr lang="ko-KR" altLang="en-US" sz="1600" dirty="0"/>
+              <a:t>태블릿 등의 무선을 더 많이 사용하는 추세입니다</a:t>
+            </a:r>
+            <a:br>
+              <a:rPr lang="en-US" altLang="ko-KR" sz="1600" dirty="0"/>
+            </a:br>
+            <a:r>
+              <a:rPr lang="ko-KR" altLang="en-US" sz="1600" dirty="0"/>
+              <a:t>무선 통신은 </a:t>
+            </a:r>
+            <a:r>
+              <a:rPr lang="en-US" altLang="ko-KR" sz="1600" dirty="0"/>
+              <a:t>Wi-Fi 802.11 wireless LAN </a:t>
+            </a:r>
+            <a:r>
+              <a:rPr lang="ko-KR" altLang="en-US" sz="1600" dirty="0"/>
+              <a:t>표준을 사용하고</a:t>
+            </a:r>
+            <a:r>
+              <a:rPr lang="en-US" altLang="ko-KR" sz="1600" dirty="0"/>
+              <a:t>,</a:t>
+            </a:r>
+            <a:br>
+              <a:rPr lang="en-US" altLang="ko-KR" sz="1600" dirty="0"/>
+            </a:br>
+            <a:r>
+              <a:rPr lang="en-US" altLang="ko-KR" sz="1600" dirty="0"/>
+              <a:t>2G, 3G, 4G(LTE), 5G, 6G</a:t>
+            </a:r>
+            <a:r>
+              <a:rPr lang="ko-KR" altLang="en-US" sz="1600" dirty="0"/>
+              <a:t>들은 대표적인 </a:t>
+            </a:r>
+            <a:r>
+              <a:rPr lang="en-US" altLang="ko-KR" sz="1600" dirty="0"/>
+              <a:t>IEEE 802.11(Wi-Fi)</a:t>
+            </a:r>
+            <a:r>
+              <a:rPr lang="ko-KR" altLang="en-US" sz="1600" dirty="0"/>
+              <a:t>표준 기술들입니다</a:t>
+            </a:r>
+            <a:endParaRPr lang="en-US" altLang="ko-KR" sz="1600" dirty="0"/>
+          </a:p>
+          <a:p>
+            <a:r>
+              <a:rPr lang="ko-KR" altLang="en-US" sz="1600" dirty="0"/>
+              <a:t>무선 통신은 여러 대의 무선 스테이션</a:t>
+            </a:r>
+            <a:r>
+              <a:rPr lang="en-US" altLang="ko-KR" sz="1600" dirty="0"/>
+              <a:t>(</a:t>
+            </a:r>
+            <a:r>
+              <a:rPr lang="ko-KR" altLang="en-US" sz="1600" dirty="0"/>
+              <a:t>무선 단말기</a:t>
+            </a:r>
+            <a:r>
+              <a:rPr lang="en-US" altLang="ko-KR" sz="1600" dirty="0"/>
+              <a:t>)</a:t>
+            </a:r>
+            <a:r>
+              <a:rPr lang="ko-KR" altLang="en-US" sz="1600" dirty="0"/>
+              <a:t>와 하나의 무선 기지국</a:t>
+            </a:r>
+            <a:r>
+              <a:rPr lang="en-US" altLang="ko-KR" sz="1600" dirty="0"/>
+              <a:t>(</a:t>
+            </a:r>
+            <a:r>
+              <a:rPr lang="ko-KR" altLang="en-US" sz="1600" dirty="0"/>
+              <a:t>무선 신호기</a:t>
+            </a:r>
+            <a:r>
+              <a:rPr lang="en-US" altLang="ko-KR" sz="1600" dirty="0"/>
+              <a:t>)</a:t>
+            </a:r>
+            <a:r>
+              <a:rPr lang="ko-KR" altLang="en-US" sz="1600" dirty="0"/>
+              <a:t>가 있고</a:t>
+            </a:r>
+            <a:r>
+              <a:rPr lang="en-US" altLang="ko-KR" sz="1600" dirty="0"/>
+              <a:t>,</a:t>
+            </a:r>
+            <a:br>
+              <a:rPr lang="en-US" altLang="ko-KR" sz="1600" dirty="0"/>
+            </a:br>
+            <a:r>
+              <a:rPr lang="ko-KR" altLang="en-US" sz="1600" dirty="0"/>
+              <a:t>상호 연결된 해당 그룹을 </a:t>
+            </a:r>
+            <a:r>
+              <a:rPr lang="en-US" altLang="ko-KR" sz="1600" dirty="0"/>
+              <a:t>BSS(Basic Service Set)</a:t>
+            </a:r>
+            <a:r>
+              <a:rPr lang="ko-KR" altLang="en-US" sz="1600" dirty="0"/>
+              <a:t>라고 표현합니다</a:t>
+            </a:r>
+            <a:endParaRPr lang="en-US" altLang="ko-KR" sz="1600" dirty="0"/>
+          </a:p>
+          <a:p>
+            <a:r>
+              <a:rPr lang="ko-KR" altLang="en-US" sz="1600" dirty="0"/>
+              <a:t>하나의 무선 신호기는 </a:t>
+            </a:r>
+            <a:r>
+              <a:rPr lang="en-US" altLang="ko-KR" sz="1600" dirty="0"/>
+              <a:t>SSID(Service Set Identifier)</a:t>
+            </a:r>
+            <a:r>
+              <a:rPr lang="ko-KR" altLang="en-US" sz="1600" dirty="0"/>
+              <a:t>를 가지고 있으며</a:t>
+            </a:r>
+            <a:r>
+              <a:rPr lang="en-US" altLang="ko-KR" sz="1600" dirty="0"/>
+              <a:t>,</a:t>
+            </a:r>
+            <a:br>
+              <a:rPr lang="en-US" altLang="ko-KR" sz="1600" dirty="0"/>
+            </a:br>
+            <a:r>
+              <a:rPr lang="ko-KR" altLang="en-US" sz="1600" dirty="0"/>
+              <a:t>여러 대의 무선 단말기는 </a:t>
+            </a:r>
+            <a:r>
+              <a:rPr lang="en-US" altLang="ko-KR" sz="1600" dirty="0"/>
+              <a:t>MAC</a:t>
+            </a:r>
+            <a:r>
+              <a:rPr lang="ko-KR" altLang="en-US" sz="1600" dirty="0"/>
+              <a:t>주소를 가지고</a:t>
+            </a:r>
+            <a:r>
+              <a:rPr lang="en-US" altLang="ko-KR" sz="1600" dirty="0"/>
+              <a:t>, </a:t>
+            </a:r>
+            <a:r>
+              <a:rPr lang="ko-KR" altLang="en-US" sz="1600" dirty="0"/>
+              <a:t>신호기가 </a:t>
+            </a:r>
+            <a:r>
+              <a:rPr lang="en-US" altLang="ko-KR" sz="1600" dirty="0"/>
+              <a:t>SSID-MAC </a:t>
+            </a:r>
+            <a:r>
+              <a:rPr lang="ko-KR" altLang="en-US" sz="1600" dirty="0"/>
+              <a:t>조합의 비컨 프레임</a:t>
+            </a:r>
+            <a:r>
+              <a:rPr lang="en-US" altLang="ko-KR" sz="1600" dirty="0"/>
+              <a:t>(beacon</a:t>
+            </a:r>
+            <a:r>
+              <a:rPr lang="ko-KR" altLang="en-US" sz="1600" dirty="0"/>
+              <a:t> </a:t>
+            </a:r>
+            <a:r>
+              <a:rPr lang="en-US" altLang="ko-KR" sz="1600" dirty="0"/>
+              <a:t>frame)</a:t>
+            </a:r>
+            <a:r>
+              <a:rPr lang="ko-KR" altLang="en-US" sz="1600" dirty="0"/>
+              <a:t>을</a:t>
+            </a:r>
+            <a:br>
+              <a:rPr lang="en-US" altLang="ko-KR" sz="1600" dirty="0"/>
+            </a:br>
+            <a:r>
+              <a:rPr lang="ko-KR" altLang="en-US" sz="1600" dirty="0"/>
+              <a:t>주기적으로 전송하여 단말기가 조합에 맞으면 주고 받는 방식으로 통신을 수행합니다</a:t>
+            </a:r>
+            <a:endParaRPr lang="en-US" altLang="ko-KR" sz="1600" dirty="0"/>
+          </a:p>
+          <a:p>
+            <a:pPr marL="342900" indent="-342900">
+              <a:buFont typeface="+mj-lt"/>
+              <a:buAutoNum type="arabicPeriod"/>
+            </a:pPr>
+            <a:r>
+              <a:rPr lang="ko-KR" altLang="en-US" sz="1400" dirty="0"/>
+              <a:t>수동 스캐닝</a:t>
+            </a:r>
+            <a:r>
+              <a:rPr lang="en-US" altLang="ko-KR" sz="1400" dirty="0"/>
+              <a:t>: </a:t>
+            </a:r>
+            <a:r>
+              <a:rPr lang="ko-KR" altLang="en-US" sz="1400" dirty="0"/>
+              <a:t>신호기가 임의로 뿌린 비컨 프레임을 단말기가 받으면</a:t>
+            </a:r>
+            <a:r>
+              <a:rPr lang="en-US" altLang="ko-KR" sz="1400" dirty="0"/>
+              <a:t>, </a:t>
+            </a:r>
+            <a:r>
+              <a:rPr lang="ko-KR" altLang="en-US" sz="1400" dirty="0"/>
+              <a:t>단말기는 뿌린 신호기에게</a:t>
+            </a:r>
+            <a:br>
+              <a:rPr lang="en-US" altLang="ko-KR" sz="1400" dirty="0"/>
+            </a:br>
+            <a:r>
+              <a:rPr lang="ko-KR" altLang="en-US" sz="1400" dirty="0"/>
+              <a:t>응답 프레임을 보내는 구조로 연결을 맺습니다 </a:t>
+            </a:r>
+            <a:endParaRPr lang="en-US" altLang="ko-KR" sz="1400" dirty="0"/>
+          </a:p>
+          <a:p>
+            <a:pPr marL="342900" indent="-342900">
+              <a:buFont typeface="+mj-lt"/>
+              <a:buAutoNum type="arabicPeriod"/>
+            </a:pPr>
+            <a:r>
+              <a:rPr lang="ko-KR" altLang="en-US" sz="1400" dirty="0"/>
+              <a:t>능동 스캐닝</a:t>
+            </a:r>
+            <a:r>
+              <a:rPr lang="en-US" altLang="ko-KR" sz="1400" dirty="0"/>
+              <a:t>: </a:t>
+            </a:r>
+            <a:r>
+              <a:rPr lang="ko-KR" altLang="en-US" sz="1400" dirty="0"/>
+              <a:t>단말기가 신호기에게 정기적으로 </a:t>
+            </a:r>
+            <a:r>
+              <a:rPr lang="ko-KR" altLang="en-US" sz="1400" dirty="0" err="1"/>
+              <a:t>프로브</a:t>
+            </a:r>
+            <a:r>
+              <a:rPr lang="en-US" altLang="ko-KR" sz="1400" dirty="0"/>
+              <a:t>(probe)</a:t>
+            </a:r>
+            <a:r>
+              <a:rPr lang="ko-KR" altLang="en-US" sz="1400" dirty="0"/>
+              <a:t>프레임을 보내면</a:t>
+            </a:r>
+            <a:r>
+              <a:rPr lang="en-US" altLang="ko-KR" sz="1400" dirty="0"/>
+              <a:t>,</a:t>
+            </a:r>
+            <a:br>
+              <a:rPr lang="en-US" altLang="ko-KR" sz="1400" dirty="0"/>
+            </a:br>
+            <a:r>
+              <a:rPr lang="ko-KR" altLang="en-US" sz="1400" dirty="0"/>
+              <a:t>신호기는 해당 요청에 응답 프레임을 보내는 구조로 연결을 맺습니다</a:t>
+            </a:r>
+            <a:endParaRPr lang="en-US" altLang="ko-KR" sz="1400" dirty="0"/>
+          </a:p>
+          <a:p>
+            <a:r>
+              <a:rPr lang="ko-KR" altLang="en-US" sz="1600" dirty="0"/>
+              <a:t>무선랜은 매체접근을 </a:t>
+            </a:r>
+            <a:r>
+              <a:rPr lang="en-US" altLang="ko-KR" sz="1600" dirty="0"/>
+              <a:t>MAC</a:t>
+            </a:r>
+            <a:r>
+              <a:rPr lang="ko-KR" altLang="en-US" sz="1600" dirty="0"/>
+              <a:t>을 통해서 수행합니다 다음은 매체접근제어방식 두 가지를 나열 한 것입니다</a:t>
+            </a:r>
+            <a:endParaRPr lang="en-US" altLang="ko-KR" sz="1600" dirty="0"/>
+          </a:p>
+          <a:p>
+            <a:pPr marL="342900" indent="-342900">
+              <a:buFont typeface="+mj-lt"/>
+              <a:buAutoNum type="arabicPeriod"/>
+            </a:pPr>
+            <a:r>
+              <a:rPr lang="en-US" altLang="ko-KR" sz="1400" dirty="0"/>
+              <a:t>DCF(Distributed Coordination Function): </a:t>
+            </a:r>
+            <a:r>
+              <a:rPr lang="ko-KR" altLang="en-US" sz="1400" dirty="0"/>
+              <a:t>단말기들이 데이터 충돌을 회피</a:t>
+            </a:r>
+            <a:r>
+              <a:rPr lang="en-US" altLang="ko-KR" sz="1400" dirty="0"/>
+              <a:t>(CSMA/CA)</a:t>
+            </a:r>
+            <a:r>
+              <a:rPr lang="ko-KR" altLang="en-US" sz="1400" dirty="0"/>
+              <a:t>하기 위해 미리 감지 후 대기</a:t>
+            </a:r>
+            <a:endParaRPr lang="en-US" altLang="ko-KR" sz="1400" dirty="0"/>
+          </a:p>
+          <a:p>
+            <a:pPr marL="342900" indent="-342900">
+              <a:buFont typeface="+mj-lt"/>
+              <a:buAutoNum type="arabicPeriod"/>
+            </a:pPr>
+            <a:r>
+              <a:rPr lang="en-US" altLang="ko-KR" sz="1400" dirty="0"/>
+              <a:t>PCF(Point Coordination Function): </a:t>
+            </a:r>
+            <a:r>
+              <a:rPr lang="ko-KR" altLang="en-US" sz="1400" dirty="0"/>
+              <a:t>신호기가 단말기들에게 직접 중재하는 방식으로 대기</a:t>
+            </a:r>
           </a:p>
         </p:txBody>
       </p:sp>
@@ -5477,7 +6201,7 @@
           <a:p>
             <a:r>
               <a:rPr lang="en-US" altLang="ko-KR" dirty="0"/>
-              <a:t>802.11 Version</a:t>
+              <a:t>CSMA/CA</a:t>
             </a:r>
             <a:endParaRPr lang="ko-KR" altLang="en-US" dirty="0"/>
           </a:p>
@@ -5499,12 +6223,326 @@
             <p:ph idx="1"/>
           </p:nvPr>
         </p:nvSpPr>
-        <p:spPr/>
-        <p:txBody>
-          <a:bodyPr/>
-          <a:lstStyle/>
-          <a:p>
-            <a:endParaRPr lang="ko-KR" altLang="en-US"/>
+        <p:spPr>
+          <a:xfrm>
+            <a:off x="762000" y="1765139"/>
+            <a:ext cx="10759440" cy="5048616"/>
+          </a:xfrm>
+        </p:spPr>
+        <p:txBody>
+          <a:bodyPr/>
+          <a:lstStyle/>
+          <a:p>
+            <a:r>
+              <a:rPr lang="ko-KR" altLang="en-US" sz="1600" dirty="0"/>
+              <a:t>무선 신호기의 태생적인 구조와 다중 접속 중인 단말기들을 네트워크에서는</a:t>
+            </a:r>
+            <a:br>
+              <a:rPr lang="en-US" altLang="ko-KR" sz="1600" dirty="0"/>
+            </a:br>
+            <a:r>
+              <a:rPr lang="ko-KR" altLang="en-US" sz="1600" dirty="0"/>
+              <a:t>다중 접속 프로토콜</a:t>
+            </a:r>
+            <a:r>
+              <a:rPr lang="en-US" altLang="ko-KR" sz="1600" dirty="0"/>
+              <a:t>(</a:t>
+            </a:r>
+            <a:r>
+              <a:rPr lang="ko-KR" altLang="en-US" sz="1600" dirty="0"/>
+              <a:t>충돌회피</a:t>
+            </a:r>
+            <a:r>
+              <a:rPr lang="en-US" altLang="ko-KR" sz="1600" dirty="0"/>
+              <a:t>)</a:t>
+            </a:r>
+            <a:r>
+              <a:rPr lang="ko-KR" altLang="en-US" sz="1600" dirty="0"/>
+              <a:t>이 필수적으로 존재해야 할 것입니다</a:t>
+            </a:r>
+            <a:endParaRPr lang="en-US" altLang="ko-KR" sz="1600" dirty="0"/>
+          </a:p>
+          <a:p>
+            <a:r>
+              <a:rPr lang="en-US" altLang="ko-KR" sz="1600" dirty="0"/>
+              <a:t>CSMA/CA(Carrier-Sense Multiple Access with Collision Avoidance)</a:t>
+            </a:r>
+            <a:r>
+              <a:rPr lang="ko-KR" altLang="en-US" sz="1600" dirty="0"/>
+              <a:t>는</a:t>
+            </a:r>
+            <a:br>
+              <a:rPr lang="en-US" altLang="ko-KR" sz="1600" dirty="0"/>
+            </a:br>
+            <a:r>
+              <a:rPr lang="ko-KR" altLang="en-US" sz="1600" dirty="0"/>
+              <a:t>데이터의 충돌을 최대한 회피하는 방향으로 설계된 프로토콜로 다음 다섯 가지 단계를 거칩니다</a:t>
+            </a:r>
+            <a:endParaRPr lang="en-US" altLang="ko-KR" sz="1600" dirty="0"/>
+          </a:p>
+          <a:p>
+            <a:pPr marL="342900" indent="-342900">
+              <a:buFont typeface="+mj-lt"/>
+              <a:buAutoNum type="arabicPeriod"/>
+            </a:pPr>
+            <a:r>
+              <a:rPr lang="ko-KR" altLang="en-US" sz="1400" dirty="0"/>
+              <a:t>프레임을 전송하고자 하는 단말기는 신호기가 </a:t>
+            </a:r>
+            <a:r>
+              <a:rPr lang="en-US" altLang="ko-KR" sz="1400" dirty="0"/>
+              <a:t>idle</a:t>
+            </a:r>
+            <a:r>
+              <a:rPr lang="ko-KR" altLang="en-US" sz="1400" dirty="0"/>
+              <a:t>인 상태가 될 때까지 기다립니다</a:t>
+            </a:r>
+            <a:endParaRPr lang="en-US" altLang="ko-KR" sz="1400" dirty="0"/>
+          </a:p>
+          <a:p>
+            <a:pPr marL="342900" indent="-342900">
+              <a:buFont typeface="+mj-lt"/>
+              <a:buAutoNum type="arabicPeriod"/>
+            </a:pPr>
+            <a:r>
+              <a:rPr lang="ko-KR" altLang="en-US" sz="1400" dirty="0"/>
+              <a:t>만약 </a:t>
+            </a:r>
+            <a:r>
+              <a:rPr lang="en-US" altLang="ko-KR" sz="1400" dirty="0"/>
+              <a:t>idle </a:t>
+            </a:r>
+            <a:r>
+              <a:rPr lang="ko-KR" altLang="en-US" sz="1400" dirty="0"/>
+              <a:t>상태가 된다면</a:t>
+            </a:r>
+            <a:r>
+              <a:rPr lang="en-US" altLang="ko-KR" sz="1400" dirty="0"/>
+              <a:t>, </a:t>
+            </a:r>
+            <a:r>
+              <a:rPr lang="ko-KR" altLang="en-US" sz="1400" dirty="0"/>
+              <a:t>다른 단말기가 사용할 가능성도 있기 때문에</a:t>
+            </a:r>
+            <a:r>
+              <a:rPr lang="en-US" altLang="ko-KR" sz="1400" dirty="0"/>
+              <a:t>,</a:t>
+            </a:r>
+            <a:br>
+              <a:rPr lang="en-US" altLang="ko-KR" sz="1400" dirty="0"/>
+            </a:br>
+            <a:r>
+              <a:rPr lang="en-US" altLang="ko-KR" sz="1400" dirty="0"/>
+              <a:t>DIFS(Distributed </a:t>
+            </a:r>
+            <a:r>
+              <a:rPr lang="en-US" altLang="ko-KR" sz="1400" dirty="0" err="1"/>
+              <a:t>InterFrame</a:t>
+            </a:r>
+            <a:r>
+              <a:rPr lang="en-US" altLang="ko-KR" sz="1400" dirty="0"/>
+              <a:t> Space)</a:t>
+            </a:r>
+            <a:r>
+              <a:rPr lang="ko-KR" altLang="en-US" sz="1400" dirty="0"/>
+              <a:t>시간동안 추가로 대기합니다</a:t>
+            </a:r>
+            <a:endParaRPr lang="en-US" altLang="ko-KR" sz="1400" dirty="0"/>
+          </a:p>
+          <a:p>
+            <a:pPr marL="342900" indent="-342900">
+              <a:buFont typeface="+mj-lt"/>
+              <a:buAutoNum type="arabicPeriod"/>
+            </a:pPr>
+            <a:r>
+              <a:rPr lang="en-US" altLang="ko-KR" sz="1400" dirty="0"/>
+              <a:t>DIFS</a:t>
+            </a:r>
+            <a:r>
+              <a:rPr lang="ko-KR" altLang="en-US" sz="1400" dirty="0"/>
+              <a:t>가 지난 뒤에도 </a:t>
+            </a:r>
+            <a:r>
+              <a:rPr lang="en-US" altLang="ko-KR" sz="1400" dirty="0"/>
+              <a:t>idle</a:t>
+            </a:r>
+            <a:r>
+              <a:rPr lang="ko-KR" altLang="en-US" sz="1400" dirty="0"/>
+              <a:t>이라면</a:t>
+            </a:r>
+            <a:r>
+              <a:rPr lang="en-US" altLang="ko-KR" sz="1400" dirty="0"/>
+              <a:t>, </a:t>
+            </a:r>
+            <a:r>
+              <a:rPr lang="ko-KR" altLang="en-US" sz="1400" dirty="0"/>
+              <a:t>수신자로부터 응답을 대기하고 프레임을 전송합니다</a:t>
+            </a:r>
+            <a:endParaRPr lang="en-US" altLang="ko-KR" sz="1400" dirty="0"/>
+          </a:p>
+          <a:p>
+            <a:pPr marL="342900" indent="-342900">
+              <a:buFont typeface="+mj-lt"/>
+              <a:buAutoNum type="arabicPeriod"/>
+            </a:pPr>
+            <a:r>
+              <a:rPr lang="ko-KR" altLang="en-US" sz="1400" dirty="0"/>
+              <a:t>만약</a:t>
+            </a:r>
+            <a:r>
+              <a:rPr lang="en-US" altLang="ko-KR" sz="1400" dirty="0"/>
+              <a:t>, idle</a:t>
+            </a:r>
+            <a:r>
+              <a:rPr lang="ko-KR" altLang="en-US" sz="1400" dirty="0"/>
+              <a:t>이 아니라면</a:t>
+            </a:r>
+            <a:r>
+              <a:rPr lang="en-US" altLang="ko-KR" sz="1400" dirty="0"/>
+              <a:t>, </a:t>
+            </a:r>
+            <a:r>
+              <a:rPr lang="ko-KR" altLang="en-US" sz="1400" dirty="0"/>
+              <a:t>랜덤 </a:t>
+            </a:r>
+            <a:r>
+              <a:rPr lang="ko-KR" altLang="en-US" sz="1400" dirty="0" err="1"/>
+              <a:t>백오프</a:t>
+            </a:r>
+            <a:r>
+              <a:rPr lang="en-US" altLang="ko-KR" sz="1400" dirty="0"/>
+              <a:t>(Random Backoff)</a:t>
+            </a:r>
+            <a:r>
+              <a:rPr lang="ko-KR" altLang="en-US" sz="1400" dirty="0"/>
+              <a:t>시간을 추가하여 대기하고</a:t>
+            </a:r>
+            <a:r>
+              <a:rPr lang="en-US" altLang="ko-KR" sz="1400" dirty="0"/>
+              <a:t>,</a:t>
+            </a:r>
+            <a:br>
+              <a:rPr lang="en-US" altLang="ko-KR" sz="1400" dirty="0"/>
+            </a:br>
+            <a:r>
+              <a:rPr lang="ko-KR" altLang="en-US" sz="1400" dirty="0" err="1"/>
+              <a:t>백오프</a:t>
+            </a:r>
+            <a:r>
+              <a:rPr lang="ko-KR" altLang="en-US" sz="1400" dirty="0"/>
+              <a:t> 시간 카운터는 정해진 슬롯 시간</a:t>
+            </a:r>
+            <a:r>
+              <a:rPr lang="en-US" altLang="ko-KR" sz="1400" dirty="0"/>
+              <a:t>(slot time)</a:t>
+            </a:r>
+            <a:r>
+              <a:rPr lang="ko-KR" altLang="en-US" sz="1400" dirty="0"/>
+              <a:t>마다 감소하는 방식으로</a:t>
+            </a:r>
+            <a:br>
+              <a:rPr lang="en-US" altLang="ko-KR" sz="1400" dirty="0"/>
+            </a:br>
+            <a:r>
+              <a:rPr lang="ko-KR" altLang="en-US" sz="1400" dirty="0"/>
+              <a:t>카운터가 다 되면</a:t>
+            </a:r>
+            <a:r>
+              <a:rPr lang="en-US" altLang="ko-KR" sz="1400" dirty="0"/>
+              <a:t>(0</a:t>
+            </a:r>
+            <a:r>
+              <a:rPr lang="ko-KR" altLang="en-US" sz="1400" dirty="0"/>
+              <a:t>에 다다르면</a:t>
+            </a:r>
+            <a:r>
+              <a:rPr lang="en-US" altLang="ko-KR" sz="1400" dirty="0"/>
+              <a:t>), </a:t>
+            </a:r>
+            <a:r>
+              <a:rPr lang="ko-KR" altLang="en-US" sz="1400" dirty="0"/>
+              <a:t>프레임을 전송하고 응답을 대기합니다</a:t>
+            </a:r>
+            <a:endParaRPr lang="en-US" altLang="ko-KR" sz="1400" dirty="0"/>
+          </a:p>
+          <a:p>
+            <a:pPr marL="342900" indent="-342900">
+              <a:buFont typeface="+mj-lt"/>
+              <a:buAutoNum type="arabicPeriod"/>
+            </a:pPr>
+            <a:r>
+              <a:rPr lang="ko-KR" altLang="en-US" sz="1400" dirty="0"/>
+              <a:t>응답이 오지 않을 경우 더 큰 </a:t>
+            </a:r>
+            <a:r>
+              <a:rPr lang="ko-KR" altLang="en-US" sz="1400" dirty="0" err="1"/>
+              <a:t>백오프</a:t>
+            </a:r>
+            <a:r>
+              <a:rPr lang="ko-KR" altLang="en-US" sz="1400" dirty="0"/>
+              <a:t> 시간을 세팅하고 다시 </a:t>
+            </a:r>
+            <a:r>
+              <a:rPr lang="ko-KR" altLang="en-US" sz="1400" dirty="0" err="1"/>
+              <a:t>백오프</a:t>
+            </a:r>
+            <a:r>
+              <a:rPr lang="ko-KR" altLang="en-US" sz="1400" dirty="0"/>
+              <a:t> 절차를 수행하는 방식으로 동작합니다</a:t>
+            </a:r>
+            <a:endParaRPr lang="en-US" altLang="ko-KR" sz="1400" dirty="0"/>
+          </a:p>
+          <a:p>
+            <a:r>
+              <a:rPr lang="ko-KR" altLang="en-US" sz="1600" dirty="0"/>
+              <a:t>그러나 랜덤 </a:t>
+            </a:r>
+            <a:r>
+              <a:rPr lang="ko-KR" altLang="en-US" sz="1600" dirty="0" err="1"/>
+              <a:t>백오프</a:t>
+            </a:r>
+            <a:r>
+              <a:rPr lang="ko-KR" altLang="en-US" sz="1600" dirty="0"/>
+              <a:t> 시간 지연 전략을 사용하더라도 숨겨진 단말 문제는 해결 할 수 없어</a:t>
+            </a:r>
+            <a:br>
+              <a:rPr lang="en-US" altLang="ko-KR" sz="1600" dirty="0"/>
+            </a:br>
+            <a:r>
+              <a:rPr lang="en-US" altLang="ko-KR" sz="1600" dirty="0"/>
+              <a:t>RTS/CTS </a:t>
+            </a:r>
+            <a:r>
+              <a:rPr lang="ko-KR" altLang="en-US" sz="1600" dirty="0"/>
+              <a:t>프레임 교환방식을 추가로 사용하여 이를 해결합니다</a:t>
+            </a:r>
+            <a:br>
+              <a:rPr lang="en-US" altLang="ko-KR" sz="1600" dirty="0"/>
+            </a:br>
+            <a:r>
+              <a:rPr lang="en-US" altLang="ko-KR" sz="1600" dirty="0"/>
+              <a:t>(</a:t>
+            </a:r>
+            <a:r>
+              <a:rPr lang="ko-KR" altLang="en-US" sz="1600" dirty="0"/>
+              <a:t>숨겨진 단말</a:t>
+            </a:r>
+            <a:r>
+              <a:rPr lang="en-US" altLang="ko-KR" sz="1600" dirty="0"/>
+              <a:t>(hidden terminal): </a:t>
+            </a:r>
+            <a:r>
+              <a:rPr lang="ko-KR" altLang="en-US" sz="1600" dirty="0"/>
+              <a:t>두 단말기가 서로 물리적 통신 범위를 벗어나 서로에 대해 모르는 경우</a:t>
+            </a:r>
+            <a:r>
+              <a:rPr lang="en-US" altLang="ko-KR" sz="1600" dirty="0"/>
+              <a:t>)</a:t>
+            </a:r>
+            <a:br>
+              <a:rPr lang="en-US" altLang="ko-KR" sz="1400" dirty="0"/>
+            </a:br>
+            <a:endParaRPr lang="ko-KR" altLang="en-US" sz="1400" dirty="0"/>
           </a:p>
         </p:txBody>
       </p:sp>
@@ -5679,10 +6717,61 @@
           <a:bodyPr/>
           <a:lstStyle/>
           <a:p>
-            <a:endParaRPr lang="ko-KR" altLang="en-US"/>
-          </a:p>
-        </p:txBody>
-      </p:sp>
+            <a:r>
+              <a:rPr lang="ko-KR" altLang="en-US" sz="1600" dirty="0" err="1"/>
+              <a:t>네이글</a:t>
+            </a:r>
+            <a:r>
+              <a:rPr lang="ko-KR" altLang="en-US" sz="1600" dirty="0"/>
+              <a:t> 알고리즘</a:t>
+            </a:r>
+            <a:r>
+              <a:rPr lang="en-US" altLang="ko-KR" sz="1600" dirty="0"/>
+              <a:t>(Nagle Algorithm)</a:t>
+            </a:r>
+            <a:r>
+              <a:rPr lang="ko-KR" altLang="en-US" sz="1600" dirty="0"/>
+              <a:t>은 </a:t>
+            </a:r>
+          </a:p>
+        </p:txBody>
+      </p:sp>
+      <p:pic>
+        <p:nvPicPr>
+          <p:cNvPr id="7" name="그림 6" descr="라인, 도표, 평행, 그래프이(가) 표시된 사진&#10;&#10;자동 생성된 설명">
+            <a:extLst>
+              <a:ext uri="{FF2B5EF4-FFF2-40B4-BE49-F238E27FC236}">
+                <a16:creationId xmlns:a16="http://schemas.microsoft.com/office/drawing/2014/main" id="{140FB463-FEC4-1CF9-7BE3-33E0F36B3CCC}"/>
+              </a:ext>
+            </a:extLst>
+          </p:cNvPr>
+          <p:cNvPicPr>
+            <a:picLocks noChangeAspect="1"/>
+          </p:cNvPicPr>
+          <p:nvPr/>
+        </p:nvPicPr>
+        <p:blipFill>
+          <a:blip r:embed="rId2">
+            <a:extLst>
+              <a:ext uri="{28A0092B-C50C-407E-A947-70E740481C1C}">
+                <a14:useLocalDpi xmlns:a14="http://schemas.microsoft.com/office/drawing/2010/main" val="0"/>
+              </a:ext>
+            </a:extLst>
+          </a:blip>
+          <a:stretch>
+            <a:fillRect/>
+          </a:stretch>
+        </p:blipFill>
+        <p:spPr>
+          <a:xfrm>
+            <a:off x="5587352" y="4114801"/>
+            <a:ext cx="6431020" cy="2548880"/>
+          </a:xfrm>
+          <a:prstGeom prst="rect">
+            <a:avLst/>
+          </a:prstGeom>
+        </p:spPr>
+      </p:pic>
     </p:spTree>
     <p:extLst>
       <p:ext uri="{BB962C8B-B14F-4D97-AF65-F5344CB8AC3E}">

</xml_diff>